<commit_message>
Ver 3.0.2: Minor Changes ssssssssssssssssssssssssssssssssssssssssssssssssssssssssssssssssss
</commit_message>
<xml_diff>
--- a/CapstoneVideoFinalSlide.pptx
+++ b/CapstoneVideoFinalSlide.pptx
@@ -3377,8 +3377,8 @@
         </p:nvSpPr>
         <p:spPr>
           <a:xfrm>
-            <a:off x="2360629" y="2186004"/>
-            <a:ext cx="4642751" cy="497670"/>
+            <a:off x="2096588" y="2186004"/>
+            <a:ext cx="5696808" cy="497670"/>
           </a:xfrm>
           <a:prstGeom prst="rect">
             <a:avLst/>
@@ -3417,22 +3417,26 @@
           <a:p>
             <a:pPr algn="l"/>
             <a:r>
-              <a:rPr lang="en-US" sz="3600" dirty="0" smtClean="0"/>
+              <a:rPr lang="en-US" sz="4000" dirty="0" smtClean="0"/>
               <a:t>VISIT </a:t>
             </a:r>
             <a:r>
-              <a:rPr lang="en-US" sz="3600" dirty="0" smtClean="0"/>
+              <a:rPr lang="en-US" sz="4000" dirty="0" smtClean="0"/>
               <a:t>THE</a:t>
             </a:r>
             <a:r>
-              <a:rPr lang="en-US" sz="3600" dirty="0" smtClean="0"/>
+              <a:rPr lang="en-US" sz="4000" dirty="0" smtClean="0"/>
               <a:t> </a:t>
             </a:r>
             <a:r>
-              <a:rPr lang="en-US" sz="3600" dirty="0" smtClean="0"/>
-              <a:t>WEBSITE!</a:t>
-            </a:r>
-            <a:endParaRPr lang="en-US" sz="3600" dirty="0"/>
+              <a:rPr lang="en-US" sz="4400" dirty="0" smtClean="0"/>
+              <a:t>WEBSITE</a:t>
+            </a:r>
+            <a:r>
+              <a:rPr lang="en-US" sz="4000" dirty="0" smtClean="0"/>
+              <a:t>!</a:t>
+            </a:r>
+            <a:endParaRPr lang="en-US" sz="4000" dirty="0"/>
           </a:p>
         </p:txBody>
       </p:sp>
@@ -3444,8 +3448,8 @@
         </p:nvSpPr>
         <p:spPr>
           <a:xfrm>
-            <a:off x="578378" y="3067429"/>
-            <a:ext cx="8172706" cy="584776"/>
+            <a:off x="396920" y="3067429"/>
+            <a:ext cx="8494047" cy="646331"/>
           </a:xfrm>
           <a:prstGeom prst="rect">
             <a:avLst/>
@@ -3459,14 +3463,18 @@
           <a:lstStyle/>
           <a:p>
             <a:r>
-              <a:rPr lang="en-US" sz="3200" b="1" dirty="0" smtClean="0"/>
-              <a:t>https</a:t>
-            </a:r>
-            <a:r>
-              <a:rPr lang="en-US" sz="3200" b="1" dirty="0"/>
-              <a:t>://dataincswami2015.herokuapp.com/</a:t>
-            </a:r>
-            <a:endParaRPr lang="en-US" sz="3200" b="1" dirty="0" smtClean="0"/>
+              <a:rPr lang="en-US" sz="3600" b="1" dirty="0"/>
+              <a:t>https://</a:t>
+            </a:r>
+            <a:r>
+              <a:rPr lang="en-US" sz="3600" b="1" dirty="0" err="1"/>
+              <a:t>patentlitpredict.herokuapp.com</a:t>
+            </a:r>
+            <a:r>
+              <a:rPr lang="en-US" sz="3600" b="1" dirty="0"/>
+              <a:t>/</a:t>
+            </a:r>
+            <a:endParaRPr lang="en-US" sz="3600" b="1" dirty="0" smtClean="0"/>
           </a:p>
         </p:txBody>
       </p:sp>

</xml_diff>